<commit_message>
Removed mass flux term from momentum equation causing instability.
</commit_message>
<xml_diff>
--- a/Chemical Vapour Deposition Model.pptx
+++ b/Chemical Vapour Deposition Model.pptx
@@ -3679,6 +3679,62 @@
           </a:prstGeom>
         </p:spPr>
       </p:pic>
+      <p:sp>
+        <p:nvSpPr>
+          <p:cNvPr id="3" name="TextBox 2">
+            <a:extLst>
+              <a:ext uri="{FF2B5EF4-FFF2-40B4-BE49-F238E27FC236}">
+                <a16:creationId xmlns:a16="http://schemas.microsoft.com/office/drawing/2014/main" id="{FCE6267A-5A7F-7CB1-66BB-7DF67E3BB30B}"/>
+              </a:ext>
+            </a:extLst>
+          </p:cNvPr>
+          <p:cNvSpPr txBox="1"/>
+          <p:nvPr/>
+        </p:nvSpPr>
+        <p:spPr>
+          <a:xfrm>
+            <a:off x="782955" y="1690688"/>
+            <a:ext cx="4434840" cy="1200329"/>
+          </a:xfrm>
+          <a:prstGeom prst="rect">
+            <a:avLst/>
+          </a:prstGeom>
+          <a:noFill/>
+        </p:spPr>
+        <p:txBody>
+          <a:bodyPr wrap="square" rtlCol="0">
+            <a:spAutoFit/>
+          </a:bodyPr>
+          <a:lstStyle/>
+          <a:p>
+            <a:pPr marL="285750" indent="-285750">
+              <a:buFont typeface="Arial" panose="020B0604020202020204" pitchFamily="34" charset="0"/>
+              <a:buChar char="•"/>
+            </a:pPr>
+            <a:r>
+              <a:rPr lang="en-US" dirty="0"/>
+              <a:t>SIMPLE Algorithm</a:t>
+            </a:r>
+          </a:p>
+          <a:p>
+            <a:pPr marL="742950" lvl="1" indent="-285750">
+              <a:buFont typeface="Arial" panose="020B0604020202020204" pitchFamily="34" charset="0"/>
+              <a:buChar char="•"/>
+            </a:pPr>
+            <a:r>
+              <a:rPr lang="en-US" dirty="0"/>
+              <a:t>Semi-Implicit Method for Pressure-Linked Equations</a:t>
+            </a:r>
+          </a:p>
+          <a:p>
+            <a:pPr marL="742950" lvl="1" indent="-285750">
+              <a:buFont typeface="Arial" panose="020B0604020202020204" pitchFamily="34" charset="0"/>
+              <a:buChar char="•"/>
+            </a:pPr>
+            <a:endParaRPr lang="en-US" dirty="0"/>
+          </a:p>
+        </p:txBody>
+      </p:sp>
     </p:spTree>
     <p:extLst>
       <p:ext uri="{BB962C8B-B14F-4D97-AF65-F5344CB8AC3E}">
@@ -3737,8 +3793,8 @@
           </a:p>
         </p:txBody>
       </p:sp>
-      <mc:AlternateContent xmlns:mc="http://schemas.openxmlformats.org/markup-compatibility/2006" xmlns:a14="http://schemas.microsoft.com/office/drawing/2010/main">
-        <mc:Choice Requires="a14">
+      <mc:AlternateContent xmlns:mc="http://schemas.openxmlformats.org/markup-compatibility/2006">
+        <mc:Choice xmlns:a14="http://schemas.microsoft.com/office/drawing/2010/main" Requires="a14">
           <p:sp>
             <p:nvSpPr>
               <p:cNvPr id="3" name="Content Placeholder 2">
@@ -3805,14 +3861,7 @@
                         <a:latin typeface="Cambria Math" panose="02040503050406030204" pitchFamily="18" charset="0"/>
                         <a:ea typeface="Cambria Math" panose="02040503050406030204" pitchFamily="18" charset="0"/>
                       </a:rPr>
-                      <m:t>=</m:t>
-                    </m:r>
-                    <m:r>
-                      <a:rPr lang="en-US" b="0" i="1" smtClean="0">
-                        <a:latin typeface="Cambria Math" panose="02040503050406030204" pitchFamily="18" charset="0"/>
-                        <a:ea typeface="Cambria Math" panose="02040503050406030204" pitchFamily="18" charset="0"/>
-                      </a:rPr>
-                      <m:t>0</m:t>
+                      <m:t>=0</m:t>
                     </m:r>
                   </m:oMath>
                 </a14:m>
@@ -4013,13 +4062,7 @@
                       <a:rPr lang="en-US" b="0" i="1" smtClean="0">
                         <a:latin typeface="Cambria Math" panose="02040503050406030204" pitchFamily="18" charset="0"/>
                       </a:rPr>
-                      <m:t>=</m:t>
-                    </m:r>
-                    <m:r>
-                      <a:rPr lang="en-US" b="0" i="1" smtClean="0">
-                        <a:latin typeface="Cambria Math" panose="02040503050406030204" pitchFamily="18" charset="0"/>
-                      </a:rPr>
-                      <m:t>0</m:t>
+                      <m:t>=0</m:t>
                     </m:r>
                   </m:oMath>
                 </a14:m>
@@ -4148,10 +4191,6 @@
               </a:p>
               <a:p>
                 <a:pPr lvl="1"/>
-                <a:endParaRPr lang="en-US" dirty="0"/>
-              </a:p>
-              <a:p>
-                <a:pPr lvl="1"/>
                 <a14:m>
                   <m:oMath xmlns:m="http://schemas.openxmlformats.org/officeDocument/2006/math">
                     <m:r>
@@ -4355,7 +4394,7 @@
             </p:txBody>
           </p:sp>
         </mc:Choice>
-        <mc:Fallback xmlns="">
+        <mc:Fallback>
           <p:sp>
             <p:nvSpPr>
               <p:cNvPr id="3" name="Content Placeholder 2">
@@ -7743,8 +7782,8 @@
           </a:p>
         </p:txBody>
       </p:sp>
-      <mc:AlternateContent xmlns:mc="http://schemas.openxmlformats.org/markup-compatibility/2006">
-        <mc:Choice xmlns:a14="http://schemas.microsoft.com/office/drawing/2010/main" Requires="a14">
+      <mc:AlternateContent xmlns:mc="http://schemas.openxmlformats.org/markup-compatibility/2006" xmlns:a14="http://schemas.microsoft.com/office/drawing/2010/main">
+        <mc:Choice Requires="a14">
           <p:sp>
             <p:nvSpPr>
               <p:cNvPr id="4" name="Content Placeholder 2">
@@ -8356,7 +8395,7 @@
             </p:txBody>
           </p:sp>
         </mc:Choice>
-        <mc:Fallback>
+        <mc:Fallback xmlns="">
           <p:sp>
             <p:nvSpPr>
               <p:cNvPr id="4" name="Content Placeholder 2">
@@ -9677,8 +9716,8 @@
           </a:extLst>
         </p:spPr>
       </p:pic>
-      <mc:AlternateContent xmlns:mc="http://schemas.openxmlformats.org/markup-compatibility/2006">
-        <mc:Choice xmlns:a14="http://schemas.microsoft.com/office/drawing/2010/main" Requires="a14">
+      <mc:AlternateContent xmlns:mc="http://schemas.openxmlformats.org/markup-compatibility/2006" xmlns:a14="http://schemas.microsoft.com/office/drawing/2010/main">
+        <mc:Choice Requires="a14">
           <p:sp>
             <p:nvSpPr>
               <p:cNvPr id="6" name="TextBox 5">
@@ -9707,7 +9746,6 @@
               </a:bodyPr>
               <a:lstStyle/>
               <a:p>
-                <a:pPr/>
                 <a:r>
                   <a:rPr lang="en-US" b="0" dirty="0"/>
                   <a:t>Forward Elimination</a:t>
@@ -10138,7 +10176,7 @@
             </p:txBody>
           </p:sp>
         </mc:Choice>
-        <mc:Fallback>
+        <mc:Fallback xmlns="">
           <p:sp>
             <p:nvSpPr>
               <p:cNvPr id="6" name="TextBox 5">
@@ -10835,8 +10873,8 @@
           </a:graphicData>
         </a:graphic>
       </p:graphicFrame>
-      <mc:AlternateContent xmlns:mc="http://schemas.openxmlformats.org/markup-compatibility/2006">
-        <mc:Choice xmlns:a14="http://schemas.microsoft.com/office/drawing/2010/main" Requires="a14">
+      <mc:AlternateContent xmlns:mc="http://schemas.openxmlformats.org/markup-compatibility/2006" xmlns:a14="http://schemas.microsoft.com/office/drawing/2010/main">
+        <mc:Choice Requires="a14">
           <p:sp>
             <p:nvSpPr>
               <p:cNvPr id="6" name="TextBox 5">
@@ -11346,7 +11384,7 @@
             </p:txBody>
           </p:sp>
         </mc:Choice>
-        <mc:Fallback>
+        <mc:Fallback xmlns="">
           <p:sp>
             <p:nvSpPr>
               <p:cNvPr id="6" name="TextBox 5">

</xml_diff>